<commit_message>
im tired and going to bed
</commit_message>
<xml_diff>
--- a/jenkins.pptx
+++ b/jenkins.pptx
@@ -7,6 +7,16 @@
   <p:sldIdLst>
     <p:sldId id="256" r:id="rId2"/>
     <p:sldId id="257" r:id="rId3"/>
+    <p:sldId id="258" r:id="rId4"/>
+    <p:sldId id="266" r:id="rId5"/>
+    <p:sldId id="259" r:id="rId6"/>
+    <p:sldId id="261" r:id="rId7"/>
+    <p:sldId id="262" r:id="rId8"/>
+    <p:sldId id="263" r:id="rId9"/>
+    <p:sldId id="267" r:id="rId10"/>
+    <p:sldId id="265" r:id="rId11"/>
+    <p:sldId id="264" r:id="rId12"/>
+    <p:sldId id="260" r:id="rId13"/>
   </p:sldIdLst>
   <p:sldSz cx="12192000" cy="6858000"/>
   <p:notesSz cx="6858000" cy="9144000"/>
@@ -3439,6 +3449,463 @@
 </p:sld>
 </file>
 
+<file path=ppt/slides/slide10.xml><?xml version="1.0" encoding="utf-8"?>
+<p:sld xmlns:a="http://schemas.openxmlformats.org/drawingml/2006/main" xmlns:r="http://schemas.openxmlformats.org/officeDocument/2006/relationships" xmlns:p="http://schemas.openxmlformats.org/presentationml/2006/main">
+  <p:cSld>
+    <p:spTree>
+      <p:nvGrpSpPr>
+        <p:cNvPr id="1" name=""/>
+        <p:cNvGrpSpPr/>
+        <p:nvPr/>
+      </p:nvGrpSpPr>
+      <p:grpSpPr>
+        <a:xfrm>
+          <a:off x="0" y="0"/>
+          <a:ext cx="0" cy="0"/>
+          <a:chOff x="0" y="0"/>
+          <a:chExt cx="0" cy="0"/>
+        </a:xfrm>
+      </p:grpSpPr>
+      <p:sp>
+        <p:nvSpPr>
+          <p:cNvPr id="2" name="Title 1">
+            <a:extLst>
+              <a:ext uri="{FF2B5EF4-FFF2-40B4-BE49-F238E27FC236}">
+                <a16:creationId xmlns:a16="http://schemas.microsoft.com/office/drawing/2014/main" id="{23A28C9C-386C-BA4E-8812-779841A67C8B}"/>
+              </a:ext>
+            </a:extLst>
+          </p:cNvPr>
+          <p:cNvSpPr>
+            <a:spLocks noGrp="1"/>
+          </p:cNvSpPr>
+          <p:nvPr>
+            <p:ph type="title"/>
+          </p:nvPr>
+        </p:nvSpPr>
+        <p:spPr/>
+        <p:txBody>
+          <a:bodyPr/>
+          <a:lstStyle/>
+          <a:p>
+            <a:r>
+              <a:rPr lang="en-US" dirty="0"/>
+              <a:t>what are we </a:t>
+            </a:r>
+            <a:r>
+              <a:rPr lang="en-US" dirty="0" err="1"/>
+              <a:t>gonna</a:t>
+            </a:r>
+            <a:r>
+              <a:rPr lang="en-US" dirty="0"/>
+              <a:t> do then?</a:t>
+            </a:r>
+          </a:p>
+        </p:txBody>
+      </p:sp>
+      <p:sp>
+        <p:nvSpPr>
+          <p:cNvPr id="3" name="Content Placeholder 2">
+            <a:extLst>
+              <a:ext uri="{FF2B5EF4-FFF2-40B4-BE49-F238E27FC236}">
+                <a16:creationId xmlns:a16="http://schemas.microsoft.com/office/drawing/2014/main" id="{62B3780F-108C-7F4A-90D8-6B2AC392E368}"/>
+              </a:ext>
+            </a:extLst>
+          </p:cNvPr>
+          <p:cNvSpPr>
+            <a:spLocks noGrp="1"/>
+          </p:cNvSpPr>
+          <p:nvPr>
+            <p:ph idx="1"/>
+          </p:nvPr>
+        </p:nvSpPr>
+        <p:spPr/>
+        <p:txBody>
+          <a:bodyPr/>
+          <a:lstStyle/>
+          <a:p>
+            <a:pPr marL="0" indent="0">
+              <a:buNone/>
+            </a:pPr>
+            <a:r>
+              <a:rPr lang="en-US" dirty="0"/>
+              <a:t>least amount of configuring as we need to</a:t>
+            </a:r>
+          </a:p>
+          <a:p>
+            <a:pPr marL="0" indent="0">
+              <a:buNone/>
+            </a:pPr>
+            <a:r>
+              <a:rPr lang="en-US" dirty="0"/>
+              <a:t>Jenkins in docker no configuration</a:t>
+            </a:r>
+          </a:p>
+          <a:p>
+            <a:pPr marL="0" indent="0">
+              <a:buNone/>
+            </a:pPr>
+            <a:r>
+              <a:rPr lang="en-US" dirty="0"/>
+              <a:t>Jenkins in docker preconfigured</a:t>
+            </a:r>
+          </a:p>
+          <a:p>
+            <a:pPr marL="0" indent="0">
+              <a:buNone/>
+            </a:pPr>
+            <a:r>
+              <a:rPr lang="en-US" dirty="0"/>
+              <a:t>Jenkins in docker to build docker</a:t>
+            </a:r>
+          </a:p>
+          <a:p>
+            <a:pPr marL="0" indent="0">
+              <a:buNone/>
+            </a:pPr>
+            <a:r>
+              <a:rPr lang="en-US" dirty="0"/>
+              <a:t>	because docker brings along </a:t>
+            </a:r>
+            <a:r>
+              <a:rPr lang="en-US" dirty="0" err="1"/>
+              <a:t>dependancies</a:t>
+            </a:r>
+            <a:endParaRPr lang="en-US" dirty="0"/>
+          </a:p>
+          <a:p>
+            <a:pPr marL="0" indent="0">
+              <a:buNone/>
+            </a:pPr>
+            <a:r>
+              <a:rPr lang="en-US" dirty="0"/>
+              <a:t>	</a:t>
+            </a:r>
+          </a:p>
+        </p:txBody>
+      </p:sp>
+      <p:pic>
+        <p:nvPicPr>
+          <p:cNvPr id="5" name="Graphic 4">
+            <a:extLst>
+              <a:ext uri="{FF2B5EF4-FFF2-40B4-BE49-F238E27FC236}">
+                <a16:creationId xmlns:a16="http://schemas.microsoft.com/office/drawing/2014/main" id="{4581E00A-E43B-6A43-A26C-4744C7842FC8}"/>
+              </a:ext>
+            </a:extLst>
+          </p:cNvPr>
+          <p:cNvPicPr>
+            <a:picLocks noChangeAspect="1"/>
+          </p:cNvPicPr>
+          <p:nvPr/>
+        </p:nvPicPr>
+        <p:blipFill>
+          <a:blip r:embed="rId2">
+            <a:extLst>
+              <a:ext uri="{96DAC541-7B7A-43D3-8B79-37D633B846F1}">
+                <asvg:svgBlip xmlns:asvg="http://schemas.microsoft.com/office/drawing/2016/SVG/main" r:embed="rId3"/>
+              </a:ext>
+            </a:extLst>
+          </a:blip>
+          <a:stretch>
+            <a:fillRect/>
+          </a:stretch>
+        </p:blipFill>
+        <p:spPr>
+          <a:xfrm>
+            <a:off x="10545536" y="69298"/>
+            <a:ext cx="1646464" cy="1917216"/>
+          </a:xfrm>
+          <a:prstGeom prst="rect">
+            <a:avLst/>
+          </a:prstGeom>
+        </p:spPr>
+      </p:pic>
+    </p:spTree>
+    <p:extLst>
+      <p:ext uri="{BB962C8B-B14F-4D97-AF65-F5344CB8AC3E}">
+        <p14:creationId xmlns:p14="http://schemas.microsoft.com/office/powerpoint/2010/main" val="880472760"/>
+      </p:ext>
+    </p:extLst>
+  </p:cSld>
+  <p:clrMapOvr>
+    <a:masterClrMapping/>
+  </p:clrMapOvr>
+</p:sld>
+</file>
+
+<file path=ppt/slides/slide11.xml><?xml version="1.0" encoding="utf-8"?>
+<p:sld xmlns:a="http://schemas.openxmlformats.org/drawingml/2006/main" xmlns:r="http://schemas.openxmlformats.org/officeDocument/2006/relationships" xmlns:p="http://schemas.openxmlformats.org/presentationml/2006/main">
+  <p:cSld>
+    <p:spTree>
+      <p:nvGrpSpPr>
+        <p:cNvPr id="1" name=""/>
+        <p:cNvGrpSpPr/>
+        <p:nvPr/>
+      </p:nvGrpSpPr>
+      <p:grpSpPr>
+        <a:xfrm>
+          <a:off x="0" y="0"/>
+          <a:ext cx="0" cy="0"/>
+          <a:chOff x="0" y="0"/>
+          <a:chExt cx="0" cy="0"/>
+        </a:xfrm>
+      </p:grpSpPr>
+      <p:sp>
+        <p:nvSpPr>
+          <p:cNvPr id="2" name="Title 1">
+            <a:extLst>
+              <a:ext uri="{FF2B5EF4-FFF2-40B4-BE49-F238E27FC236}">
+                <a16:creationId xmlns:a16="http://schemas.microsoft.com/office/drawing/2014/main" id="{23A28C9C-386C-BA4E-8812-779841A67C8B}"/>
+              </a:ext>
+            </a:extLst>
+          </p:cNvPr>
+          <p:cNvSpPr>
+            <a:spLocks noGrp="1"/>
+          </p:cNvSpPr>
+          <p:nvPr>
+            <p:ph type="title"/>
+          </p:nvPr>
+        </p:nvSpPr>
+        <p:spPr/>
+        <p:txBody>
+          <a:bodyPr/>
+          <a:lstStyle/>
+          <a:p>
+            <a:r>
+              <a:rPr lang="en-US" dirty="0"/>
+              <a:t>DEMO - time</a:t>
+            </a:r>
+          </a:p>
+        </p:txBody>
+      </p:sp>
+      <p:sp>
+        <p:nvSpPr>
+          <p:cNvPr id="3" name="Content Placeholder 2">
+            <a:extLst>
+              <a:ext uri="{FF2B5EF4-FFF2-40B4-BE49-F238E27FC236}">
+                <a16:creationId xmlns:a16="http://schemas.microsoft.com/office/drawing/2014/main" id="{62B3780F-108C-7F4A-90D8-6B2AC392E368}"/>
+              </a:ext>
+            </a:extLst>
+          </p:cNvPr>
+          <p:cNvSpPr>
+            <a:spLocks noGrp="1"/>
+          </p:cNvSpPr>
+          <p:nvPr>
+            <p:ph idx="1"/>
+          </p:nvPr>
+        </p:nvSpPr>
+        <p:spPr/>
+        <p:txBody>
+          <a:bodyPr/>
+          <a:lstStyle/>
+          <a:p>
+            <a:pPr marL="0" indent="0">
+              <a:buNone/>
+            </a:pPr>
+            <a:endParaRPr lang="en-US" dirty="0"/>
+          </a:p>
+        </p:txBody>
+      </p:sp>
+      <p:pic>
+        <p:nvPicPr>
+          <p:cNvPr id="8" name="Picture 7">
+            <a:extLst>
+              <a:ext uri="{FF2B5EF4-FFF2-40B4-BE49-F238E27FC236}">
+                <a16:creationId xmlns:a16="http://schemas.microsoft.com/office/drawing/2014/main" id="{C0086E2E-762A-E341-9E71-E021C5C69A71}"/>
+              </a:ext>
+            </a:extLst>
+          </p:cNvPr>
+          <p:cNvPicPr>
+            <a:picLocks noChangeAspect="1"/>
+          </p:cNvPicPr>
+          <p:nvPr/>
+        </p:nvPicPr>
+        <p:blipFill>
+          <a:blip r:embed="rId2"/>
+          <a:stretch>
+            <a:fillRect/>
+          </a:stretch>
+        </p:blipFill>
+        <p:spPr>
+          <a:xfrm>
+            <a:off x="3623683" y="1490088"/>
+            <a:ext cx="5694488" cy="5215513"/>
+          </a:xfrm>
+          <a:prstGeom prst="rect">
+            <a:avLst/>
+          </a:prstGeom>
+        </p:spPr>
+      </p:pic>
+    </p:spTree>
+    <p:extLst>
+      <p:ext uri="{BB962C8B-B14F-4D97-AF65-F5344CB8AC3E}">
+        <p14:creationId xmlns:p14="http://schemas.microsoft.com/office/powerpoint/2010/main" val="1542348170"/>
+      </p:ext>
+    </p:extLst>
+  </p:cSld>
+  <p:clrMapOvr>
+    <a:masterClrMapping/>
+  </p:clrMapOvr>
+</p:sld>
+</file>
+
+<file path=ppt/slides/slide12.xml><?xml version="1.0" encoding="utf-8"?>
+<p:sld xmlns:a="http://schemas.openxmlformats.org/drawingml/2006/main" xmlns:r="http://schemas.openxmlformats.org/officeDocument/2006/relationships" xmlns:p="http://schemas.openxmlformats.org/presentationml/2006/main">
+  <p:cSld>
+    <p:spTree>
+      <p:nvGrpSpPr>
+        <p:cNvPr id="1" name=""/>
+        <p:cNvGrpSpPr/>
+        <p:nvPr/>
+      </p:nvGrpSpPr>
+      <p:grpSpPr>
+        <a:xfrm>
+          <a:off x="0" y="0"/>
+          <a:ext cx="0" cy="0"/>
+          <a:chOff x="0" y="0"/>
+          <a:chExt cx="0" cy="0"/>
+        </a:xfrm>
+      </p:grpSpPr>
+      <p:sp>
+        <p:nvSpPr>
+          <p:cNvPr id="2" name="Title 1">
+            <a:extLst>
+              <a:ext uri="{FF2B5EF4-FFF2-40B4-BE49-F238E27FC236}">
+                <a16:creationId xmlns:a16="http://schemas.microsoft.com/office/drawing/2014/main" id="{CB00E359-1A34-8B4F-B3FB-A95F60075A9D}"/>
+              </a:ext>
+            </a:extLst>
+          </p:cNvPr>
+          <p:cNvSpPr>
+            <a:spLocks noGrp="1"/>
+          </p:cNvSpPr>
+          <p:nvPr>
+            <p:ph type="title"/>
+          </p:nvPr>
+        </p:nvSpPr>
+        <p:spPr/>
+        <p:txBody>
+          <a:bodyPr/>
+          <a:lstStyle/>
+          <a:p>
+            <a:r>
+              <a:rPr lang="en-US" dirty="0"/>
+              <a:t>links</a:t>
+            </a:r>
+          </a:p>
+        </p:txBody>
+      </p:sp>
+      <p:sp>
+        <p:nvSpPr>
+          <p:cNvPr id="3" name="Content Placeholder 2">
+            <a:extLst>
+              <a:ext uri="{FF2B5EF4-FFF2-40B4-BE49-F238E27FC236}">
+                <a16:creationId xmlns:a16="http://schemas.microsoft.com/office/drawing/2014/main" id="{24148B43-B30B-494B-A04F-791C8B595C9E}"/>
+              </a:ext>
+            </a:extLst>
+          </p:cNvPr>
+          <p:cNvSpPr>
+            <a:spLocks noGrp="1"/>
+          </p:cNvSpPr>
+          <p:nvPr>
+            <p:ph idx="1"/>
+          </p:nvPr>
+        </p:nvSpPr>
+        <p:spPr/>
+        <p:txBody>
+          <a:bodyPr>
+            <a:normAutofit/>
+          </a:bodyPr>
+          <a:lstStyle/>
+          <a:p>
+            <a:pPr marL="0" indent="0">
+              <a:buNone/>
+            </a:pPr>
+            <a:r>
+              <a:rPr lang="en-US" sz="1400" dirty="0">
+                <a:hlinkClick r:id="rId2"/>
+              </a:rPr>
+              <a:t>https://www.infoworld.com/article/3239666/what-is-jenkins-the-ci-server-explained.html</a:t>
+            </a:r>
+            <a:endParaRPr lang="en-US" sz="1400" dirty="0"/>
+          </a:p>
+          <a:p>
+            <a:pPr marL="0" indent="0">
+              <a:buNone/>
+            </a:pPr>
+            <a:r>
+              <a:rPr lang="en-US" sz="1400" dirty="0">
+                <a:hlinkClick r:id="rId3"/>
+              </a:rPr>
+              <a:t>https://medium.com/@mightywomble/jenkins-pipeline-beginners-guide-f3868f715ed9</a:t>
+            </a:r>
+            <a:endParaRPr lang="en-US" sz="1400" dirty="0"/>
+          </a:p>
+          <a:p>
+            <a:pPr marL="0" indent="0">
+              <a:buNone/>
+            </a:pPr>
+            <a:r>
+              <a:rPr lang="en-US" sz="1400" dirty="0">
+                <a:hlinkClick r:id="rId4"/>
+              </a:rPr>
+              <a:t>https://jenkins.io/doc/</a:t>
+            </a:r>
+            <a:endParaRPr lang="en-US" sz="1400" dirty="0"/>
+          </a:p>
+          <a:p>
+            <a:pPr marL="0" indent="0">
+              <a:buNone/>
+            </a:pPr>
+            <a:endParaRPr lang="en-US" sz="1400" dirty="0">
+              <a:hlinkClick r:id="rId5"/>
+            </a:endParaRPr>
+          </a:p>
+          <a:p>
+            <a:pPr marL="0" indent="0">
+              <a:buNone/>
+            </a:pPr>
+            <a:r>
+              <a:rPr lang="en-US" sz="1400" dirty="0">
+                <a:hlinkClick r:id="rId5"/>
+              </a:rPr>
+              <a:t>https://technologyconversations.com/2017/06/16/automating-jenkins-docker-setup/</a:t>
+            </a:r>
+          </a:p>
+          <a:p>
+            <a:pPr marL="0" indent="0">
+              <a:buNone/>
+            </a:pPr>
+            <a:r>
+              <a:rPr lang="en-US" sz="1400" dirty="0">
+                <a:hlinkClick r:id="rId5"/>
+              </a:rPr>
+              <a:t>h</a:t>
+            </a:r>
+            <a:r>
+              <a:rPr lang="en-US" sz="1400" dirty="0">
+                <a:hlinkClick r:id="rId5"/>
+              </a:rPr>
+              <a:t>ttps://medium.com/@manav503/how-to-build-docker-images-inside-a-jenkins-container-d59944102f30</a:t>
+            </a:r>
+            <a:r>
+              <a:rPr lang="en-US" sz="1400" dirty="0"/>
+              <a:t> </a:t>
+            </a:r>
+          </a:p>
+        </p:txBody>
+      </p:sp>
+    </p:spTree>
+    <p:extLst>
+      <p:ext uri="{BB962C8B-B14F-4D97-AF65-F5344CB8AC3E}">
+        <p14:creationId xmlns:p14="http://schemas.microsoft.com/office/powerpoint/2010/main" val="2905254594"/>
+      </p:ext>
+    </p:extLst>
+  </p:cSld>
+  <p:clrMapOvr>
+    <a:masterClrMapping/>
+  </p:clrMapOvr>
+</p:sld>
+</file>
+
 <file path=ppt/slides/slide2.xml><?xml version="1.0" encoding="utf-8"?>
 <p:sld xmlns:a="http://schemas.openxmlformats.org/drawingml/2006/main" xmlns:r="http://schemas.openxmlformats.org/officeDocument/2006/relationships" xmlns:p="http://schemas.openxmlformats.org/presentationml/2006/main">
   <p:cSld>
@@ -3482,9 +3949,10 @@
               <a:t>what is </a:t>
             </a:r>
             <a:r>
-              <a:rPr lang="en-US"/>
+              <a:rPr lang="en-US" dirty="0" err="1"/>
               <a:t>jenkins</a:t>
             </a:r>
+            <a:endParaRPr lang="en-US" dirty="0"/>
           </a:p>
         </p:txBody>
       </p:sp>
@@ -3509,14 +3977,1336 @@
           <a:bodyPr/>
           <a:lstStyle/>
           <a:p>
-            <a:endParaRPr lang="en-US"/>
-          </a:p>
-        </p:txBody>
-      </p:sp>
+            <a:pPr marL="0" indent="0">
+              <a:buNone/>
+            </a:pPr>
+            <a:r>
+              <a:rPr lang="en-US" dirty="0"/>
+              <a:t>automation server</a:t>
+            </a:r>
+          </a:p>
+          <a:p>
+            <a:pPr marL="0" indent="0">
+              <a:buNone/>
+            </a:pPr>
+            <a:r>
+              <a:rPr lang="en-US" dirty="0"/>
+              <a:t>self contained</a:t>
+            </a:r>
+          </a:p>
+          <a:p>
+            <a:pPr marL="0" indent="0">
+              <a:buNone/>
+            </a:pPr>
+            <a:r>
+              <a:rPr lang="en-US" dirty="0"/>
+              <a:t>open source</a:t>
+            </a:r>
+          </a:p>
+          <a:p>
+            <a:pPr marL="0" indent="0">
+              <a:buNone/>
+            </a:pPr>
+            <a:endParaRPr lang="en-US" dirty="0"/>
+          </a:p>
+          <a:p>
+            <a:pPr marL="0" indent="0">
+              <a:buNone/>
+            </a:pPr>
+            <a:r>
+              <a:rPr lang="en-US" dirty="0"/>
+              <a:t>CI (continuous integration)</a:t>
+            </a:r>
+          </a:p>
+          <a:p>
+            <a:pPr marL="0" indent="0">
+              <a:buNone/>
+            </a:pPr>
+            <a:r>
+              <a:rPr lang="en-US" dirty="0"/>
+              <a:t>with the ability to be CD (continuous delivery) </a:t>
+            </a:r>
+          </a:p>
+          <a:p>
+            <a:pPr marL="0" indent="0">
+              <a:buNone/>
+            </a:pPr>
+            <a:r>
+              <a:rPr lang="en-US" dirty="0"/>
+              <a:t>	via pipelines</a:t>
+            </a:r>
+          </a:p>
+        </p:txBody>
+      </p:sp>
+      <p:pic>
+        <p:nvPicPr>
+          <p:cNvPr id="5" name="Picture 4">
+            <a:extLst>
+              <a:ext uri="{FF2B5EF4-FFF2-40B4-BE49-F238E27FC236}">
+                <a16:creationId xmlns:a16="http://schemas.microsoft.com/office/drawing/2014/main" id="{7F5C97E6-F237-9D4A-AAD4-60FE2D99C7B2}"/>
+              </a:ext>
+            </a:extLst>
+          </p:cNvPr>
+          <p:cNvPicPr>
+            <a:picLocks noChangeAspect="1"/>
+          </p:cNvPicPr>
+          <p:nvPr/>
+        </p:nvPicPr>
+        <p:blipFill>
+          <a:blip r:embed="rId2"/>
+          <a:stretch>
+            <a:fillRect/>
+          </a:stretch>
+        </p:blipFill>
+        <p:spPr>
+          <a:xfrm>
+            <a:off x="10345553" y="-642258"/>
+            <a:ext cx="2016493" cy="2852057"/>
+          </a:xfrm>
+          <a:prstGeom prst="rect">
+            <a:avLst/>
+          </a:prstGeom>
+        </p:spPr>
+      </p:pic>
     </p:spTree>
     <p:extLst>
       <p:ext uri="{BB962C8B-B14F-4D97-AF65-F5344CB8AC3E}">
         <p14:creationId xmlns:p14="http://schemas.microsoft.com/office/powerpoint/2010/main" val="3866643649"/>
+      </p:ext>
+    </p:extLst>
+  </p:cSld>
+  <p:clrMapOvr>
+    <a:masterClrMapping/>
+  </p:clrMapOvr>
+</p:sld>
+</file>
+
+<file path=ppt/slides/slide3.xml><?xml version="1.0" encoding="utf-8"?>
+<p:sld xmlns:a="http://schemas.openxmlformats.org/drawingml/2006/main" xmlns:r="http://schemas.openxmlformats.org/officeDocument/2006/relationships" xmlns:p="http://schemas.openxmlformats.org/presentationml/2006/main">
+  <p:cSld>
+    <p:spTree>
+      <p:nvGrpSpPr>
+        <p:cNvPr id="1" name=""/>
+        <p:cNvGrpSpPr/>
+        <p:nvPr/>
+      </p:nvGrpSpPr>
+      <p:grpSpPr>
+        <a:xfrm>
+          <a:off x="0" y="0"/>
+          <a:ext cx="0" cy="0"/>
+          <a:chOff x="0" y="0"/>
+          <a:chExt cx="0" cy="0"/>
+        </a:xfrm>
+      </p:grpSpPr>
+      <p:sp>
+        <p:nvSpPr>
+          <p:cNvPr id="2" name="Title 1">
+            <a:extLst>
+              <a:ext uri="{FF2B5EF4-FFF2-40B4-BE49-F238E27FC236}">
+                <a16:creationId xmlns:a16="http://schemas.microsoft.com/office/drawing/2014/main" id="{23A28C9C-386C-BA4E-8812-779841A67C8B}"/>
+              </a:ext>
+            </a:extLst>
+          </p:cNvPr>
+          <p:cNvSpPr>
+            <a:spLocks noGrp="1"/>
+          </p:cNvSpPr>
+          <p:nvPr>
+            <p:ph type="title"/>
+          </p:nvPr>
+        </p:nvSpPr>
+        <p:spPr/>
+        <p:txBody>
+          <a:bodyPr/>
+          <a:lstStyle/>
+          <a:p>
+            <a:r>
+              <a:rPr lang="en-US" dirty="0"/>
+              <a:t>why?</a:t>
+            </a:r>
+          </a:p>
+        </p:txBody>
+      </p:sp>
+      <p:sp>
+        <p:nvSpPr>
+          <p:cNvPr id="3" name="Content Placeholder 2">
+            <a:extLst>
+              <a:ext uri="{FF2B5EF4-FFF2-40B4-BE49-F238E27FC236}">
+                <a16:creationId xmlns:a16="http://schemas.microsoft.com/office/drawing/2014/main" id="{62B3780F-108C-7F4A-90D8-6B2AC392E368}"/>
+              </a:ext>
+            </a:extLst>
+          </p:cNvPr>
+          <p:cNvSpPr>
+            <a:spLocks noGrp="1"/>
+          </p:cNvSpPr>
+          <p:nvPr>
+            <p:ph idx="1"/>
+          </p:nvPr>
+        </p:nvSpPr>
+        <p:spPr/>
+        <p:txBody>
+          <a:bodyPr/>
+          <a:lstStyle/>
+          <a:p>
+            <a:pPr marL="0" indent="0">
+              <a:buNone/>
+            </a:pPr>
+            <a:r>
+              <a:rPr lang="en-US" dirty="0"/>
+              <a:t>because automation is cool?</a:t>
+            </a:r>
+          </a:p>
+          <a:p>
+            <a:pPr marL="0" indent="0">
+              <a:buNone/>
+            </a:pPr>
+            <a:r>
+              <a:rPr lang="en-US" dirty="0"/>
+              <a:t>repeatability</a:t>
+            </a:r>
+          </a:p>
+          <a:p>
+            <a:pPr marL="0" indent="0">
+              <a:buNone/>
+            </a:pPr>
+            <a:r>
+              <a:rPr lang="en-US" dirty="0"/>
+              <a:t>hands off</a:t>
+            </a:r>
+          </a:p>
+          <a:p>
+            <a:pPr marL="0" indent="0">
+              <a:buNone/>
+            </a:pPr>
+            <a:endParaRPr lang="en-US" dirty="0"/>
+          </a:p>
+          <a:p>
+            <a:pPr marL="0" indent="0">
+              <a:buNone/>
+            </a:pPr>
+            <a:endParaRPr lang="en-US" dirty="0"/>
+          </a:p>
+        </p:txBody>
+      </p:sp>
+      <p:pic>
+        <p:nvPicPr>
+          <p:cNvPr id="6" name="Picture 5">
+            <a:extLst>
+              <a:ext uri="{FF2B5EF4-FFF2-40B4-BE49-F238E27FC236}">
+                <a16:creationId xmlns:a16="http://schemas.microsoft.com/office/drawing/2014/main" id="{DBDF1F26-F663-4D44-9B1A-F0C54C143F22}"/>
+              </a:ext>
+            </a:extLst>
+          </p:cNvPr>
+          <p:cNvPicPr>
+            <a:picLocks noChangeAspect="1"/>
+          </p:cNvPicPr>
+          <p:nvPr/>
+        </p:nvPicPr>
+        <p:blipFill>
+          <a:blip r:embed="rId2"/>
+          <a:stretch>
+            <a:fillRect/>
+          </a:stretch>
+        </p:blipFill>
+        <p:spPr>
+          <a:xfrm>
+            <a:off x="10505694" y="0"/>
+            <a:ext cx="1696211" cy="1545771"/>
+          </a:xfrm>
+          <a:prstGeom prst="rect">
+            <a:avLst/>
+          </a:prstGeom>
+        </p:spPr>
+      </p:pic>
+    </p:spTree>
+    <p:extLst>
+      <p:ext uri="{BB962C8B-B14F-4D97-AF65-F5344CB8AC3E}">
+        <p14:creationId xmlns:p14="http://schemas.microsoft.com/office/powerpoint/2010/main" val="4055206393"/>
+      </p:ext>
+    </p:extLst>
+  </p:cSld>
+  <p:clrMapOvr>
+    <a:masterClrMapping/>
+  </p:clrMapOvr>
+</p:sld>
+</file>
+
+<file path=ppt/slides/slide4.xml><?xml version="1.0" encoding="utf-8"?>
+<p:sld xmlns:a="http://schemas.openxmlformats.org/drawingml/2006/main" xmlns:r="http://schemas.openxmlformats.org/officeDocument/2006/relationships" xmlns:p="http://schemas.openxmlformats.org/presentationml/2006/main">
+  <p:cSld>
+    <p:spTree>
+      <p:nvGrpSpPr>
+        <p:cNvPr id="1" name=""/>
+        <p:cNvGrpSpPr/>
+        <p:nvPr/>
+      </p:nvGrpSpPr>
+      <p:grpSpPr>
+        <a:xfrm>
+          <a:off x="0" y="0"/>
+          <a:ext cx="0" cy="0"/>
+          <a:chOff x="0" y="0"/>
+          <a:chExt cx="0" cy="0"/>
+        </a:xfrm>
+      </p:grpSpPr>
+      <p:sp>
+        <p:nvSpPr>
+          <p:cNvPr id="2" name="Title 1">
+            <a:extLst>
+              <a:ext uri="{FF2B5EF4-FFF2-40B4-BE49-F238E27FC236}">
+                <a16:creationId xmlns:a16="http://schemas.microsoft.com/office/drawing/2014/main" id="{23A28C9C-386C-BA4E-8812-779841A67C8B}"/>
+              </a:ext>
+            </a:extLst>
+          </p:cNvPr>
+          <p:cNvSpPr>
+            <a:spLocks noGrp="1"/>
+          </p:cNvSpPr>
+          <p:nvPr>
+            <p:ph type="title"/>
+          </p:nvPr>
+        </p:nvSpPr>
+        <p:spPr/>
+        <p:txBody>
+          <a:bodyPr/>
+          <a:lstStyle/>
+          <a:p>
+            <a:r>
+              <a:rPr lang="en-US" dirty="0"/>
+              <a:t>Jenkins architecture</a:t>
+            </a:r>
+          </a:p>
+        </p:txBody>
+      </p:sp>
+      <p:sp>
+        <p:nvSpPr>
+          <p:cNvPr id="3" name="Content Placeholder 2">
+            <a:extLst>
+              <a:ext uri="{FF2B5EF4-FFF2-40B4-BE49-F238E27FC236}">
+                <a16:creationId xmlns:a16="http://schemas.microsoft.com/office/drawing/2014/main" id="{62B3780F-108C-7F4A-90D8-6B2AC392E368}"/>
+              </a:ext>
+            </a:extLst>
+          </p:cNvPr>
+          <p:cNvSpPr>
+            <a:spLocks noGrp="1"/>
+          </p:cNvSpPr>
+          <p:nvPr>
+            <p:ph idx="1"/>
+          </p:nvPr>
+        </p:nvSpPr>
+        <p:spPr/>
+        <p:txBody>
+          <a:bodyPr/>
+          <a:lstStyle/>
+          <a:p>
+            <a:pPr marL="0" indent="0">
+              <a:buNone/>
+            </a:pPr>
+            <a:r>
+              <a:rPr lang="en-US" dirty="0"/>
+              <a:t>master/slave</a:t>
+            </a:r>
+          </a:p>
+          <a:p>
+            <a:pPr marL="0" indent="0">
+              <a:buNone/>
+            </a:pPr>
+            <a:r>
+              <a:rPr lang="en-US" dirty="0"/>
+              <a:t>many many slaves</a:t>
+            </a:r>
+          </a:p>
+          <a:p>
+            <a:pPr marL="0" indent="0">
+              <a:buNone/>
+            </a:pPr>
+            <a:r>
+              <a:rPr lang="en-US" dirty="0"/>
+              <a:t>- complicated </a:t>
+            </a:r>
+          </a:p>
+          <a:p>
+            <a:pPr marL="0" indent="0">
+              <a:buNone/>
+            </a:pPr>
+            <a:r>
+              <a:rPr lang="en-US" dirty="0"/>
+              <a:t>for here – single node where master is a standalone</a:t>
+            </a:r>
+          </a:p>
+          <a:p>
+            <a:pPr marL="0" indent="0">
+              <a:buNone/>
+            </a:pPr>
+            <a:r>
+              <a:rPr lang="en-US" dirty="0"/>
+              <a:t>- less complicated</a:t>
+            </a:r>
+          </a:p>
+          <a:p>
+            <a:pPr marL="0" indent="0">
+              <a:buNone/>
+            </a:pPr>
+            <a:endParaRPr lang="en-US" dirty="0"/>
+          </a:p>
+        </p:txBody>
+      </p:sp>
+      <p:pic>
+        <p:nvPicPr>
+          <p:cNvPr id="5" name="Graphic 4">
+            <a:extLst>
+              <a:ext uri="{FF2B5EF4-FFF2-40B4-BE49-F238E27FC236}">
+                <a16:creationId xmlns:a16="http://schemas.microsoft.com/office/drawing/2014/main" id="{817FBB2C-67BA-0340-B6B2-02909C7DF73F}"/>
+              </a:ext>
+            </a:extLst>
+          </p:cNvPr>
+          <p:cNvPicPr>
+            <a:picLocks noChangeAspect="1"/>
+          </p:cNvPicPr>
+          <p:nvPr/>
+        </p:nvPicPr>
+        <p:blipFill>
+          <a:blip r:embed="rId2">
+            <a:extLst>
+              <a:ext uri="{96DAC541-7B7A-43D3-8B79-37D633B846F1}">
+                <asvg:svgBlip xmlns:asvg="http://schemas.microsoft.com/office/drawing/2016/SVG/main" r:embed="rId3"/>
+              </a:ext>
+            </a:extLst>
+          </a:blip>
+          <a:stretch>
+            <a:fillRect/>
+          </a:stretch>
+        </p:blipFill>
+        <p:spPr>
+          <a:xfrm>
+            <a:off x="10925447" y="49161"/>
+            <a:ext cx="1266553" cy="1776464"/>
+          </a:xfrm>
+          <a:prstGeom prst="rect">
+            <a:avLst/>
+          </a:prstGeom>
+        </p:spPr>
+      </p:pic>
+    </p:spTree>
+    <p:extLst>
+      <p:ext uri="{BB962C8B-B14F-4D97-AF65-F5344CB8AC3E}">
+        <p14:creationId xmlns:p14="http://schemas.microsoft.com/office/powerpoint/2010/main" val="2478321017"/>
+      </p:ext>
+    </p:extLst>
+  </p:cSld>
+  <p:clrMapOvr>
+    <a:masterClrMapping/>
+  </p:clrMapOvr>
+</p:sld>
+</file>
+
+<file path=ppt/slides/slide5.xml><?xml version="1.0" encoding="utf-8"?>
+<p:sld xmlns:a="http://schemas.openxmlformats.org/drawingml/2006/main" xmlns:r="http://schemas.openxmlformats.org/officeDocument/2006/relationships" xmlns:p="http://schemas.openxmlformats.org/presentationml/2006/main">
+  <p:cSld>
+    <p:spTree>
+      <p:nvGrpSpPr>
+        <p:cNvPr id="1" name=""/>
+        <p:cNvGrpSpPr/>
+        <p:nvPr/>
+      </p:nvGrpSpPr>
+      <p:grpSpPr>
+        <a:xfrm>
+          <a:off x="0" y="0"/>
+          <a:ext cx="0" cy="0"/>
+          <a:chOff x="0" y="0"/>
+          <a:chExt cx="0" cy="0"/>
+        </a:xfrm>
+      </p:grpSpPr>
+      <p:sp>
+        <p:nvSpPr>
+          <p:cNvPr id="2" name="Title 1">
+            <a:extLst>
+              <a:ext uri="{FF2B5EF4-FFF2-40B4-BE49-F238E27FC236}">
+                <a16:creationId xmlns:a16="http://schemas.microsoft.com/office/drawing/2014/main" id="{23A28C9C-386C-BA4E-8812-779841A67C8B}"/>
+              </a:ext>
+            </a:extLst>
+          </p:cNvPr>
+          <p:cNvSpPr>
+            <a:spLocks noGrp="1"/>
+          </p:cNvSpPr>
+          <p:nvPr>
+            <p:ph type="title"/>
+          </p:nvPr>
+        </p:nvSpPr>
+        <p:spPr/>
+        <p:txBody>
+          <a:bodyPr/>
+          <a:lstStyle/>
+          <a:p>
+            <a:r>
+              <a:rPr lang="en-US" dirty="0"/>
+              <a:t>pipelines</a:t>
+            </a:r>
+          </a:p>
+        </p:txBody>
+      </p:sp>
+      <p:sp>
+        <p:nvSpPr>
+          <p:cNvPr id="3" name="Content Placeholder 2">
+            <a:extLst>
+              <a:ext uri="{FF2B5EF4-FFF2-40B4-BE49-F238E27FC236}">
+                <a16:creationId xmlns:a16="http://schemas.microsoft.com/office/drawing/2014/main" id="{62B3780F-108C-7F4A-90D8-6B2AC392E368}"/>
+              </a:ext>
+            </a:extLst>
+          </p:cNvPr>
+          <p:cNvSpPr>
+            <a:spLocks noGrp="1"/>
+          </p:cNvSpPr>
+          <p:nvPr>
+            <p:ph idx="1"/>
+          </p:nvPr>
+        </p:nvSpPr>
+        <p:spPr/>
+        <p:txBody>
+          <a:bodyPr/>
+          <a:lstStyle/>
+          <a:p>
+            <a:pPr marL="0" indent="0">
+              <a:buNone/>
+            </a:pPr>
+            <a:r>
+              <a:rPr lang="en-US" dirty="0"/>
+              <a:t>first step towards CD</a:t>
+            </a:r>
+          </a:p>
+          <a:p>
+            <a:pPr marL="0" indent="0">
+              <a:buNone/>
+            </a:pPr>
+            <a:r>
+              <a:rPr lang="en-US" dirty="0"/>
+              <a:t>beginnings of immutability </a:t>
+            </a:r>
+          </a:p>
+          <a:p>
+            <a:pPr marL="0" indent="0">
+              <a:buNone/>
+            </a:pPr>
+            <a:r>
+              <a:rPr lang="en-US" dirty="0"/>
+              <a:t>12 factor app (again)</a:t>
+            </a:r>
+          </a:p>
+          <a:p>
+            <a:pPr marL="0" indent="0">
+              <a:buNone/>
+            </a:pPr>
+            <a:endParaRPr lang="en-US" dirty="0"/>
+          </a:p>
+        </p:txBody>
+      </p:sp>
+      <p:pic>
+        <p:nvPicPr>
+          <p:cNvPr id="5" name="Graphic 4">
+            <a:extLst>
+              <a:ext uri="{FF2B5EF4-FFF2-40B4-BE49-F238E27FC236}">
+                <a16:creationId xmlns:a16="http://schemas.microsoft.com/office/drawing/2014/main" id="{59936167-4DC2-9049-BB40-959875154468}"/>
+              </a:ext>
+            </a:extLst>
+          </p:cNvPr>
+          <p:cNvPicPr>
+            <a:picLocks noChangeAspect="1"/>
+          </p:cNvPicPr>
+          <p:nvPr/>
+        </p:nvPicPr>
+        <p:blipFill>
+          <a:blip r:embed="rId2">
+            <a:extLst>
+              <a:ext uri="{96DAC541-7B7A-43D3-8B79-37D633B846F1}">
+                <asvg:svgBlip xmlns:asvg="http://schemas.microsoft.com/office/drawing/2016/SVG/main" r:embed="rId3"/>
+              </a:ext>
+            </a:extLst>
+          </a:blip>
+          <a:stretch>
+            <a:fillRect/>
+          </a:stretch>
+        </p:blipFill>
+        <p:spPr>
+          <a:xfrm>
+            <a:off x="10998767" y="130629"/>
+            <a:ext cx="1193233" cy="1480457"/>
+          </a:xfrm>
+          <a:prstGeom prst="rect">
+            <a:avLst/>
+          </a:prstGeom>
+        </p:spPr>
+      </p:pic>
+    </p:spTree>
+    <p:extLst>
+      <p:ext uri="{BB962C8B-B14F-4D97-AF65-F5344CB8AC3E}">
+        <p14:creationId xmlns:p14="http://schemas.microsoft.com/office/powerpoint/2010/main" val="672093881"/>
+      </p:ext>
+    </p:extLst>
+  </p:cSld>
+  <p:clrMapOvr>
+    <a:masterClrMapping/>
+  </p:clrMapOvr>
+</p:sld>
+</file>
+
+<file path=ppt/slides/slide6.xml><?xml version="1.0" encoding="utf-8"?>
+<p:sld xmlns:a="http://schemas.openxmlformats.org/drawingml/2006/main" xmlns:r="http://schemas.openxmlformats.org/officeDocument/2006/relationships" xmlns:p="http://schemas.openxmlformats.org/presentationml/2006/main">
+  <p:cSld>
+    <p:spTree>
+      <p:nvGrpSpPr>
+        <p:cNvPr id="1" name=""/>
+        <p:cNvGrpSpPr/>
+        <p:nvPr/>
+      </p:nvGrpSpPr>
+      <p:grpSpPr>
+        <a:xfrm>
+          <a:off x="0" y="0"/>
+          <a:ext cx="0" cy="0"/>
+          <a:chOff x="0" y="0"/>
+          <a:chExt cx="0" cy="0"/>
+        </a:xfrm>
+      </p:grpSpPr>
+      <p:sp>
+        <p:nvSpPr>
+          <p:cNvPr id="2" name="Title 1">
+            <a:extLst>
+              <a:ext uri="{FF2B5EF4-FFF2-40B4-BE49-F238E27FC236}">
+                <a16:creationId xmlns:a16="http://schemas.microsoft.com/office/drawing/2014/main" id="{23A28C9C-386C-BA4E-8812-779841A67C8B}"/>
+              </a:ext>
+            </a:extLst>
+          </p:cNvPr>
+          <p:cNvSpPr>
+            <a:spLocks noGrp="1"/>
+          </p:cNvSpPr>
+          <p:nvPr>
+            <p:ph type="title"/>
+          </p:nvPr>
+        </p:nvSpPr>
+        <p:spPr/>
+        <p:txBody>
+          <a:bodyPr/>
+          <a:lstStyle/>
+          <a:p>
+            <a:r>
+              <a:rPr lang="en-US" dirty="0" err="1"/>
+              <a:t>imute</a:t>
+            </a:r>
+            <a:r>
+              <a:rPr lang="en-US" dirty="0"/>
+              <a:t>-a-what?</a:t>
+            </a:r>
+          </a:p>
+        </p:txBody>
+      </p:sp>
+      <p:sp>
+        <p:nvSpPr>
+          <p:cNvPr id="3" name="Content Placeholder 2">
+            <a:extLst>
+              <a:ext uri="{FF2B5EF4-FFF2-40B4-BE49-F238E27FC236}">
+                <a16:creationId xmlns:a16="http://schemas.microsoft.com/office/drawing/2014/main" id="{62B3780F-108C-7F4A-90D8-6B2AC392E368}"/>
+              </a:ext>
+            </a:extLst>
+          </p:cNvPr>
+          <p:cNvSpPr>
+            <a:spLocks noGrp="1"/>
+          </p:cNvSpPr>
+          <p:nvPr>
+            <p:ph idx="1"/>
+          </p:nvPr>
+        </p:nvSpPr>
+        <p:spPr/>
+        <p:txBody>
+          <a:bodyPr/>
+          <a:lstStyle/>
+          <a:p>
+            <a:pPr marL="0" indent="0">
+              <a:buNone/>
+            </a:pPr>
+            <a:r>
+              <a:rPr lang="en-US" dirty="0"/>
+              <a:t>A mutable object can be changed after it's created,</a:t>
+            </a:r>
+          </a:p>
+          <a:p>
+            <a:pPr marL="0" indent="0">
+              <a:buNone/>
+            </a:pPr>
+            <a:r>
+              <a:rPr lang="en-US" dirty="0"/>
+              <a:t>an immutable object can’t. </a:t>
+            </a:r>
+          </a:p>
+          <a:p>
+            <a:pPr marL="0" indent="0">
+              <a:buNone/>
+            </a:pPr>
+            <a:endParaRPr lang="en-US" dirty="0"/>
+          </a:p>
+          <a:p>
+            <a:pPr marL="0" indent="0">
+              <a:buNone/>
+            </a:pPr>
+            <a:r>
+              <a:rPr lang="en-US" dirty="0"/>
+              <a:t>the build is the object </a:t>
+            </a:r>
+          </a:p>
+          <a:p>
+            <a:pPr marL="0" indent="0">
+              <a:buNone/>
+            </a:pPr>
+            <a:r>
+              <a:rPr lang="en-US" dirty="0"/>
+              <a:t>guarantee the the code</a:t>
+            </a:r>
+          </a:p>
+          <a:p>
+            <a:pPr marL="0" indent="0">
+              <a:buNone/>
+            </a:pPr>
+            <a:r>
+              <a:rPr lang="en-US" dirty="0"/>
+              <a:t>persist the state</a:t>
+            </a:r>
+          </a:p>
+        </p:txBody>
+      </p:sp>
+      <p:pic>
+        <p:nvPicPr>
+          <p:cNvPr id="6" name="Graphic 5">
+            <a:extLst>
+              <a:ext uri="{FF2B5EF4-FFF2-40B4-BE49-F238E27FC236}">
+                <a16:creationId xmlns:a16="http://schemas.microsoft.com/office/drawing/2014/main" id="{FE80D2E1-627B-2445-BD40-4D225948E7CE}"/>
+              </a:ext>
+            </a:extLst>
+          </p:cNvPr>
+          <p:cNvPicPr>
+            <a:picLocks noChangeAspect="1"/>
+          </p:cNvPicPr>
+          <p:nvPr/>
+        </p:nvPicPr>
+        <p:blipFill>
+          <a:blip r:embed="rId2">
+            <a:extLst>
+              <a:ext uri="{96DAC541-7B7A-43D3-8B79-37D633B846F1}">
+                <asvg:svgBlip xmlns:asvg="http://schemas.microsoft.com/office/drawing/2016/SVG/main" r:embed="rId3"/>
+              </a:ext>
+            </a:extLst>
+          </a:blip>
+          <a:stretch>
+            <a:fillRect/>
+          </a:stretch>
+        </p:blipFill>
+        <p:spPr>
+          <a:xfrm>
+            <a:off x="10472896" y="0"/>
+            <a:ext cx="1590290" cy="1825625"/>
+          </a:xfrm>
+          <a:prstGeom prst="rect">
+            <a:avLst/>
+          </a:prstGeom>
+        </p:spPr>
+      </p:pic>
+    </p:spTree>
+    <p:extLst>
+      <p:ext uri="{BB962C8B-B14F-4D97-AF65-F5344CB8AC3E}">
+        <p14:creationId xmlns:p14="http://schemas.microsoft.com/office/powerpoint/2010/main" val="3965172831"/>
+      </p:ext>
+    </p:extLst>
+  </p:cSld>
+  <p:clrMapOvr>
+    <a:masterClrMapping/>
+  </p:clrMapOvr>
+</p:sld>
+</file>
+
+<file path=ppt/slides/slide7.xml><?xml version="1.0" encoding="utf-8"?>
+<p:sld xmlns:a="http://schemas.openxmlformats.org/drawingml/2006/main" xmlns:r="http://schemas.openxmlformats.org/officeDocument/2006/relationships" xmlns:p="http://schemas.openxmlformats.org/presentationml/2006/main">
+  <p:cSld>
+    <p:spTree>
+      <p:nvGrpSpPr>
+        <p:cNvPr id="1" name=""/>
+        <p:cNvGrpSpPr/>
+        <p:nvPr/>
+      </p:nvGrpSpPr>
+      <p:grpSpPr>
+        <a:xfrm>
+          <a:off x="0" y="0"/>
+          <a:ext cx="0" cy="0"/>
+          <a:chOff x="0" y="0"/>
+          <a:chExt cx="0" cy="0"/>
+        </a:xfrm>
+      </p:grpSpPr>
+      <p:sp>
+        <p:nvSpPr>
+          <p:cNvPr id="2" name="Title 1">
+            <a:extLst>
+              <a:ext uri="{FF2B5EF4-FFF2-40B4-BE49-F238E27FC236}">
+                <a16:creationId xmlns:a16="http://schemas.microsoft.com/office/drawing/2014/main" id="{23A28C9C-386C-BA4E-8812-779841A67C8B}"/>
+              </a:ext>
+            </a:extLst>
+          </p:cNvPr>
+          <p:cNvSpPr>
+            <a:spLocks noGrp="1"/>
+          </p:cNvSpPr>
+          <p:nvPr>
+            <p:ph type="title"/>
+          </p:nvPr>
+        </p:nvSpPr>
+        <p:spPr/>
+        <p:txBody>
+          <a:bodyPr/>
+          <a:lstStyle/>
+          <a:p>
+            <a:r>
+              <a:rPr lang="en-US" dirty="0"/>
+              <a:t>many tools</a:t>
+            </a:r>
+          </a:p>
+        </p:txBody>
+      </p:sp>
+      <p:sp>
+        <p:nvSpPr>
+          <p:cNvPr id="3" name="Content Placeholder 2">
+            <a:extLst>
+              <a:ext uri="{FF2B5EF4-FFF2-40B4-BE49-F238E27FC236}">
+                <a16:creationId xmlns:a16="http://schemas.microsoft.com/office/drawing/2014/main" id="{62B3780F-108C-7F4A-90D8-6B2AC392E368}"/>
+              </a:ext>
+            </a:extLst>
+          </p:cNvPr>
+          <p:cNvSpPr>
+            <a:spLocks noGrp="1"/>
+          </p:cNvSpPr>
+          <p:nvPr>
+            <p:ph idx="1"/>
+          </p:nvPr>
+        </p:nvSpPr>
+        <p:spPr/>
+        <p:txBody>
+          <a:bodyPr/>
+          <a:lstStyle/>
+          <a:p>
+            <a:pPr marL="0" indent="0">
+              <a:buNone/>
+            </a:pPr>
+            <a:r>
+              <a:rPr lang="en-US" dirty="0"/>
+              <a:t>many many aspects</a:t>
+            </a:r>
+          </a:p>
+          <a:p>
+            <a:pPr marL="0" indent="0">
+              <a:buNone/>
+            </a:pPr>
+            <a:r>
+              <a:rPr lang="en-US" dirty="0"/>
+              <a:t>I only care about</a:t>
+            </a:r>
+          </a:p>
+          <a:p>
+            <a:pPr>
+              <a:buFontTx/>
+              <a:buChar char="-"/>
+            </a:pPr>
+            <a:r>
+              <a:rPr lang="en-US" dirty="0" err="1"/>
+              <a:t>jenkinsfiles</a:t>
+            </a:r>
+            <a:endParaRPr lang="en-US" dirty="0"/>
+          </a:p>
+          <a:p>
+            <a:pPr>
+              <a:buFontTx/>
+              <a:buChar char="-"/>
+            </a:pPr>
+            <a:r>
+              <a:rPr lang="en-US" dirty="0"/>
+              <a:t>docker</a:t>
+            </a:r>
+          </a:p>
+          <a:p>
+            <a:pPr>
+              <a:buFontTx/>
+              <a:buChar char="-"/>
+            </a:pPr>
+            <a:r>
+              <a:rPr lang="en-US" dirty="0"/>
+              <a:t>git </a:t>
+            </a:r>
+            <a:r>
+              <a:rPr lang="en-US" dirty="0" err="1"/>
+              <a:t>scm</a:t>
+            </a:r>
+            <a:r>
+              <a:rPr lang="en-US" dirty="0"/>
+              <a:t> </a:t>
+            </a:r>
+          </a:p>
+          <a:p>
+            <a:pPr>
+              <a:buFontTx/>
+              <a:buChar char="-"/>
+            </a:pPr>
+            <a:r>
+              <a:rPr lang="en-US" dirty="0" err="1"/>
+              <a:t>github</a:t>
+            </a:r>
+            <a:r>
+              <a:rPr lang="en-US" dirty="0"/>
+              <a:t> webhook</a:t>
+            </a:r>
+          </a:p>
+          <a:p>
+            <a:pPr marL="0" indent="0">
+              <a:buNone/>
+            </a:pPr>
+            <a:endParaRPr lang="en-US" dirty="0"/>
+          </a:p>
+          <a:p>
+            <a:pPr marL="0" indent="0">
+              <a:buNone/>
+            </a:pPr>
+            <a:endParaRPr lang="en-US" dirty="0"/>
+          </a:p>
+        </p:txBody>
+      </p:sp>
+      <p:pic>
+        <p:nvPicPr>
+          <p:cNvPr id="5" name="Picture 4">
+            <a:extLst>
+              <a:ext uri="{FF2B5EF4-FFF2-40B4-BE49-F238E27FC236}">
+                <a16:creationId xmlns:a16="http://schemas.microsoft.com/office/drawing/2014/main" id="{00F69A7A-42C8-7740-BFC1-D1A80D321C0D}"/>
+              </a:ext>
+            </a:extLst>
+          </p:cNvPr>
+          <p:cNvPicPr>
+            <a:picLocks noChangeAspect="1"/>
+          </p:cNvPicPr>
+          <p:nvPr/>
+        </p:nvPicPr>
+        <p:blipFill>
+          <a:blip r:embed="rId2"/>
+          <a:stretch>
+            <a:fillRect/>
+          </a:stretch>
+        </p:blipFill>
+        <p:spPr>
+          <a:xfrm>
+            <a:off x="10181357" y="130289"/>
+            <a:ext cx="1889085" cy="1685471"/>
+          </a:xfrm>
+          <a:prstGeom prst="rect">
+            <a:avLst/>
+          </a:prstGeom>
+        </p:spPr>
+      </p:pic>
+    </p:spTree>
+    <p:extLst>
+      <p:ext uri="{BB962C8B-B14F-4D97-AF65-F5344CB8AC3E}">
+        <p14:creationId xmlns:p14="http://schemas.microsoft.com/office/powerpoint/2010/main" val="2786212508"/>
+      </p:ext>
+    </p:extLst>
+  </p:cSld>
+  <p:clrMapOvr>
+    <a:masterClrMapping/>
+  </p:clrMapOvr>
+</p:sld>
+</file>
+
+<file path=ppt/slides/slide8.xml><?xml version="1.0" encoding="utf-8"?>
+<p:sld xmlns:a="http://schemas.openxmlformats.org/drawingml/2006/main" xmlns:r="http://schemas.openxmlformats.org/officeDocument/2006/relationships" xmlns:p="http://schemas.openxmlformats.org/presentationml/2006/main">
+  <p:cSld>
+    <p:spTree>
+      <p:nvGrpSpPr>
+        <p:cNvPr id="1" name=""/>
+        <p:cNvGrpSpPr/>
+        <p:nvPr/>
+      </p:nvGrpSpPr>
+      <p:grpSpPr>
+        <a:xfrm>
+          <a:off x="0" y="0"/>
+          <a:ext cx="0" cy="0"/>
+          <a:chOff x="0" y="0"/>
+          <a:chExt cx="0" cy="0"/>
+        </a:xfrm>
+      </p:grpSpPr>
+      <p:sp>
+        <p:nvSpPr>
+          <p:cNvPr id="2" name="Title 1">
+            <a:extLst>
+              <a:ext uri="{FF2B5EF4-FFF2-40B4-BE49-F238E27FC236}">
+                <a16:creationId xmlns:a16="http://schemas.microsoft.com/office/drawing/2014/main" id="{23A28C9C-386C-BA4E-8812-779841A67C8B}"/>
+              </a:ext>
+            </a:extLst>
+          </p:cNvPr>
+          <p:cNvSpPr>
+            <a:spLocks noGrp="1"/>
+          </p:cNvSpPr>
+          <p:nvPr>
+            <p:ph type="title"/>
+          </p:nvPr>
+        </p:nvSpPr>
+        <p:spPr/>
+        <p:txBody>
+          <a:bodyPr/>
+          <a:lstStyle/>
+          <a:p>
+            <a:r>
+              <a:rPr lang="en-US" dirty="0"/>
+              <a:t>Jenkins is terrible</a:t>
+            </a:r>
+          </a:p>
+        </p:txBody>
+      </p:sp>
+      <p:sp>
+        <p:nvSpPr>
+          <p:cNvPr id="3" name="Content Placeholder 2">
+            <a:extLst>
+              <a:ext uri="{FF2B5EF4-FFF2-40B4-BE49-F238E27FC236}">
+                <a16:creationId xmlns:a16="http://schemas.microsoft.com/office/drawing/2014/main" id="{62B3780F-108C-7F4A-90D8-6B2AC392E368}"/>
+              </a:ext>
+            </a:extLst>
+          </p:cNvPr>
+          <p:cNvSpPr>
+            <a:spLocks noGrp="1"/>
+          </p:cNvSpPr>
+          <p:nvPr>
+            <p:ph idx="1"/>
+          </p:nvPr>
+        </p:nvSpPr>
+        <p:spPr/>
+        <p:txBody>
+          <a:bodyPr/>
+          <a:lstStyle/>
+          <a:p>
+            <a:pPr marL="0" indent="0">
+              <a:buNone/>
+            </a:pPr>
+            <a:r>
+              <a:rPr lang="en-US" dirty="0"/>
+              <a:t>least terrible</a:t>
+            </a:r>
+          </a:p>
+          <a:p>
+            <a:pPr marL="0" indent="0">
+              <a:buNone/>
+            </a:pPr>
+            <a:r>
+              <a:rPr lang="en-US" dirty="0"/>
+              <a:t>complex software is complex</a:t>
+            </a:r>
+          </a:p>
+          <a:p>
+            <a:pPr marL="0" indent="0">
+              <a:buNone/>
+            </a:pPr>
+            <a:r>
+              <a:rPr lang="en-US" dirty="0"/>
+              <a:t>learn how to unit test</a:t>
+            </a:r>
+          </a:p>
+          <a:p>
+            <a:pPr marL="0" indent="0">
+              <a:buNone/>
+            </a:pPr>
+            <a:r>
+              <a:rPr lang="en-US" dirty="0"/>
+              <a:t>write pass/fail tests to fail </a:t>
+            </a:r>
+            <a:r>
+              <a:rPr lang="en-US" dirty="0" err="1"/>
+              <a:t>jenkins</a:t>
+            </a:r>
+            <a:endParaRPr lang="en-US" dirty="0"/>
+          </a:p>
+          <a:p>
+            <a:pPr marL="0" indent="0">
+              <a:buNone/>
+            </a:pPr>
+            <a:r>
+              <a:rPr lang="en-US" dirty="0"/>
+              <a:t>debugging is a pain</a:t>
+            </a:r>
+          </a:p>
+          <a:p>
+            <a:pPr marL="0" indent="0">
+              <a:buNone/>
+            </a:pPr>
+            <a:r>
+              <a:rPr lang="en-US" dirty="0"/>
+              <a:t>logs aren’t great</a:t>
+            </a:r>
+          </a:p>
+          <a:p>
+            <a:pPr marL="0" indent="0">
+              <a:buNone/>
+            </a:pPr>
+            <a:r>
+              <a:rPr lang="en-US" dirty="0" err="1"/>
+              <a:t>dsl</a:t>
+            </a:r>
+            <a:r>
+              <a:rPr lang="en-US" dirty="0"/>
+              <a:t>/groovy syntax</a:t>
+            </a:r>
+          </a:p>
+        </p:txBody>
+      </p:sp>
+      <p:pic>
+        <p:nvPicPr>
+          <p:cNvPr id="6" name="Graphic 5">
+            <a:extLst>
+              <a:ext uri="{FF2B5EF4-FFF2-40B4-BE49-F238E27FC236}">
+                <a16:creationId xmlns:a16="http://schemas.microsoft.com/office/drawing/2014/main" id="{78DC7F96-539E-0A4B-84D7-3B450DD311EE}"/>
+              </a:ext>
+            </a:extLst>
+          </p:cNvPr>
+          <p:cNvPicPr>
+            <a:picLocks noChangeAspect="1"/>
+          </p:cNvPicPr>
+          <p:nvPr/>
+        </p:nvPicPr>
+        <p:blipFill>
+          <a:blip r:embed="rId2">
+            <a:extLst>
+              <a:ext uri="{96DAC541-7B7A-43D3-8B79-37D633B846F1}">
+                <asvg:svgBlip xmlns:asvg="http://schemas.microsoft.com/office/drawing/2016/SVG/main" r:embed="rId3"/>
+              </a:ext>
+            </a:extLst>
+          </a:blip>
+          <a:stretch>
+            <a:fillRect/>
+          </a:stretch>
+        </p:blipFill>
+        <p:spPr>
+          <a:xfrm>
+            <a:off x="10431241" y="0"/>
+            <a:ext cx="1558960" cy="1825625"/>
+          </a:xfrm>
+          <a:prstGeom prst="rect">
+            <a:avLst/>
+          </a:prstGeom>
+        </p:spPr>
+      </p:pic>
+      <p:pic>
+        <p:nvPicPr>
+          <p:cNvPr id="8" name="Picture 7">
+            <a:extLst>
+              <a:ext uri="{FF2B5EF4-FFF2-40B4-BE49-F238E27FC236}">
+                <a16:creationId xmlns:a16="http://schemas.microsoft.com/office/drawing/2014/main" id="{C0086E2E-762A-E341-9E71-E021C5C69A71}"/>
+              </a:ext>
+            </a:extLst>
+          </p:cNvPr>
+          <p:cNvPicPr>
+            <a:picLocks noChangeAspect="1"/>
+          </p:cNvPicPr>
+          <p:nvPr/>
+        </p:nvPicPr>
+        <p:blipFill>
+          <a:blip r:embed="rId4"/>
+          <a:stretch>
+            <a:fillRect/>
+          </a:stretch>
+        </p:blipFill>
+        <p:spPr>
+          <a:xfrm>
+            <a:off x="8380741" y="3367314"/>
+            <a:ext cx="3811259" cy="3490686"/>
+          </a:xfrm>
+          <a:prstGeom prst="rect">
+            <a:avLst/>
+          </a:prstGeom>
+        </p:spPr>
+      </p:pic>
+    </p:spTree>
+    <p:extLst>
+      <p:ext uri="{BB962C8B-B14F-4D97-AF65-F5344CB8AC3E}">
+        <p14:creationId xmlns:p14="http://schemas.microsoft.com/office/powerpoint/2010/main" val="1255504190"/>
+      </p:ext>
+    </p:extLst>
+  </p:cSld>
+  <p:clrMapOvr>
+    <a:masterClrMapping/>
+  </p:clrMapOvr>
+</p:sld>
+</file>
+
+<file path=ppt/slides/slide9.xml><?xml version="1.0" encoding="utf-8"?>
+<p:sld xmlns:a="http://schemas.openxmlformats.org/drawingml/2006/main" xmlns:r="http://schemas.openxmlformats.org/officeDocument/2006/relationships" xmlns:p="http://schemas.openxmlformats.org/presentationml/2006/main">
+  <p:cSld>
+    <p:spTree>
+      <p:nvGrpSpPr>
+        <p:cNvPr id="1" name=""/>
+        <p:cNvGrpSpPr/>
+        <p:nvPr/>
+      </p:nvGrpSpPr>
+      <p:grpSpPr>
+        <a:xfrm>
+          <a:off x="0" y="0"/>
+          <a:ext cx="0" cy="0"/>
+          <a:chOff x="0" y="0"/>
+          <a:chExt cx="0" cy="0"/>
+        </a:xfrm>
+      </p:grpSpPr>
+      <p:sp>
+        <p:nvSpPr>
+          <p:cNvPr id="2" name="Title 1">
+            <a:extLst>
+              <a:ext uri="{FF2B5EF4-FFF2-40B4-BE49-F238E27FC236}">
+                <a16:creationId xmlns:a16="http://schemas.microsoft.com/office/drawing/2014/main" id="{23A28C9C-386C-BA4E-8812-779841A67C8B}"/>
+              </a:ext>
+            </a:extLst>
+          </p:cNvPr>
+          <p:cNvSpPr>
+            <a:spLocks noGrp="1"/>
+          </p:cNvSpPr>
+          <p:nvPr>
+            <p:ph type="title"/>
+          </p:nvPr>
+        </p:nvSpPr>
+        <p:spPr/>
+        <p:txBody>
+          <a:bodyPr/>
+          <a:lstStyle/>
+          <a:p>
+            <a:r>
+              <a:rPr lang="en-US" dirty="0"/>
+              <a:t>Jenkins is dangerous</a:t>
+            </a:r>
+          </a:p>
+        </p:txBody>
+      </p:sp>
+      <p:sp>
+        <p:nvSpPr>
+          <p:cNvPr id="3" name="Content Placeholder 2">
+            <a:extLst>
+              <a:ext uri="{FF2B5EF4-FFF2-40B4-BE49-F238E27FC236}">
+                <a16:creationId xmlns:a16="http://schemas.microsoft.com/office/drawing/2014/main" id="{62B3780F-108C-7F4A-90D8-6B2AC392E368}"/>
+              </a:ext>
+            </a:extLst>
+          </p:cNvPr>
+          <p:cNvSpPr>
+            <a:spLocks noGrp="1"/>
+          </p:cNvSpPr>
+          <p:nvPr>
+            <p:ph idx="1"/>
+          </p:nvPr>
+        </p:nvSpPr>
+        <p:spPr/>
+        <p:txBody>
+          <a:bodyPr/>
+          <a:lstStyle/>
+          <a:p>
+            <a:pPr marL="0" indent="0">
+              <a:buNone/>
+            </a:pPr>
+            <a:r>
+              <a:rPr lang="en-US" dirty="0"/>
+              <a:t>should never be exposed to the internet</a:t>
+            </a:r>
+          </a:p>
+          <a:p>
+            <a:pPr marL="0" indent="0">
+              <a:buNone/>
+            </a:pPr>
+            <a:r>
+              <a:rPr lang="en-US" dirty="0"/>
+              <a:t>build chain attacks are real</a:t>
+            </a:r>
+          </a:p>
+          <a:p>
+            <a:pPr marL="0" indent="0">
+              <a:buNone/>
+            </a:pPr>
+            <a:r>
+              <a:rPr lang="en-US" dirty="0"/>
+              <a:t>massive loot: </a:t>
+            </a:r>
+          </a:p>
+          <a:p>
+            <a:pPr marL="0" indent="0">
+              <a:buNone/>
+            </a:pPr>
+            <a:r>
+              <a:rPr lang="en-US" dirty="0"/>
+              <a:t>	logins keys service accounts</a:t>
+            </a:r>
+          </a:p>
+          <a:p>
+            <a:pPr marL="0" indent="0">
+              <a:buNone/>
+            </a:pPr>
+            <a:r>
+              <a:rPr lang="en-US" dirty="0"/>
+              <a:t>LOGS and poor hygiene </a:t>
+            </a:r>
+          </a:p>
+          <a:p>
+            <a:pPr marL="0" indent="0">
+              <a:buNone/>
+            </a:pPr>
+            <a:r>
+              <a:rPr lang="en-US" dirty="0"/>
+              <a:t>privilege escalation galore</a:t>
+            </a:r>
+          </a:p>
+          <a:p>
+            <a:pPr marL="0" indent="0">
+              <a:buNone/>
+            </a:pPr>
+            <a:r>
+              <a:rPr lang="en-US" dirty="0"/>
+              <a:t>pivot pivot</a:t>
+            </a:r>
+          </a:p>
+          <a:p>
+            <a:pPr marL="0" indent="0">
+              <a:buNone/>
+            </a:pPr>
+            <a:r>
+              <a:rPr lang="en-US" dirty="0"/>
+              <a:t>bad plugins</a:t>
+            </a:r>
+          </a:p>
+        </p:txBody>
+      </p:sp>
+      <p:pic>
+        <p:nvPicPr>
+          <p:cNvPr id="5" name="Graphic 4">
+            <a:extLst>
+              <a:ext uri="{FF2B5EF4-FFF2-40B4-BE49-F238E27FC236}">
+                <a16:creationId xmlns:a16="http://schemas.microsoft.com/office/drawing/2014/main" id="{D2F86F63-4ACD-BB4A-8029-95107747100A}"/>
+              </a:ext>
+            </a:extLst>
+          </p:cNvPr>
+          <p:cNvPicPr>
+            <a:picLocks noChangeAspect="1"/>
+          </p:cNvPicPr>
+          <p:nvPr/>
+        </p:nvPicPr>
+        <p:blipFill>
+          <a:blip r:embed="rId2">
+            <a:extLst>
+              <a:ext uri="{96DAC541-7B7A-43D3-8B79-37D633B846F1}">
+                <asvg:svgBlip xmlns:asvg="http://schemas.microsoft.com/office/drawing/2016/SVG/main" r:embed="rId3"/>
+              </a:ext>
+            </a:extLst>
+          </a:blip>
+          <a:stretch>
+            <a:fillRect/>
+          </a:stretch>
+        </p:blipFill>
+        <p:spPr>
+          <a:xfrm>
+            <a:off x="10286370" y="0"/>
+            <a:ext cx="1915886" cy="1852023"/>
+          </a:xfrm>
+          <a:prstGeom prst="rect">
+            <a:avLst/>
+          </a:prstGeom>
+        </p:spPr>
+      </p:pic>
+    </p:spTree>
+    <p:extLst>
+      <p:ext uri="{BB962C8B-B14F-4D97-AF65-F5344CB8AC3E}">
+        <p14:creationId xmlns:p14="http://schemas.microsoft.com/office/powerpoint/2010/main" val="3561945329"/>
       </p:ext>
     </p:extLst>
   </p:cSld>

</xml_diff>